<commit_message>
Updating Projects and Labs
</commit_message>
<xml_diff>
--- a/Projects/Data_Viz/DataViz.pptx
+++ b/Projects/Data_Viz/DataViz.pptx
@@ -5,16 +5,17 @@
     <p:sldMasterId id="2147483648" r:id="rId1"/>
   </p:sldMasterIdLst>
   <p:notesMasterIdLst>
-    <p:notesMasterId r:id="rId9"/>
+    <p:notesMasterId r:id="rId10"/>
   </p:notesMasterIdLst>
   <p:sldIdLst>
-    <p:sldId id="256" r:id="rId2"/>
-    <p:sldId id="258" r:id="rId3"/>
-    <p:sldId id="260" r:id="rId4"/>
-    <p:sldId id="257" r:id="rId5"/>
-    <p:sldId id="262" r:id="rId6"/>
-    <p:sldId id="261" r:id="rId7"/>
-    <p:sldId id="263" r:id="rId8"/>
+    <p:sldId id="264" r:id="rId2"/>
+    <p:sldId id="256" r:id="rId3"/>
+    <p:sldId id="258" r:id="rId4"/>
+    <p:sldId id="260" r:id="rId5"/>
+    <p:sldId id="257" r:id="rId6"/>
+    <p:sldId id="262" r:id="rId7"/>
+    <p:sldId id="261" r:id="rId8"/>
+    <p:sldId id="263" r:id="rId9"/>
   </p:sldIdLst>
   <p:sldSz cx="12192000" cy="6858000"/>
   <p:notesSz cx="6858000" cy="9144000"/>
@@ -124,7 +125,7 @@
 <file path=ppt/revisionInfo.xml><?xml version="1.0" encoding="utf-8"?>
 <p1510:revInfo xmlns:a="http://schemas.openxmlformats.org/drawingml/2006/main" xmlns:r="http://schemas.openxmlformats.org/officeDocument/2006/relationships" xmlns:p1510="http://schemas.microsoft.com/office/powerpoint/2015/10/main">
   <p1510:revLst>
-    <p1510:client id="{9FCE2944-FAD2-4A75-8632-2AB48511F6FE}" v="161" dt="2020-05-09T13:04:34.358"/>
+    <p1510:client id="{9FCE2944-FAD2-4A75-8632-2AB48511F6FE}" v="169" dt="2020-05-21T18:27:52.967"/>
   </p1510:revLst>
 </p1510:revInfo>
 </file>
@@ -134,12 +135,12 @@
   <pc:docChgLst>
     <pc:chgData name="rodrigo antoniaci" userId="7098e09bc143075b" providerId="LiveId" clId="{9FCE2944-FAD2-4A75-8632-2AB48511F6FE}"/>
     <pc:docChg chg="undo custSel addSld delSld modSld sldOrd">
-      <pc:chgData name="rodrigo antoniaci" userId="7098e09bc143075b" providerId="LiveId" clId="{9FCE2944-FAD2-4A75-8632-2AB48511F6FE}" dt="2020-05-09T13:10:54.927" v="1052" actId="1076"/>
+      <pc:chgData name="rodrigo antoniaci" userId="7098e09bc143075b" providerId="LiveId" clId="{9FCE2944-FAD2-4A75-8632-2AB48511F6FE}" dt="2020-05-21T18:27:59.575" v="1070" actId="688"/>
       <pc:docMkLst>
         <pc:docMk/>
       </pc:docMkLst>
-      <pc:sldChg chg="addSp modSp mod">
-        <pc:chgData name="rodrigo antoniaci" userId="7098e09bc143075b" providerId="LiveId" clId="{9FCE2944-FAD2-4A75-8632-2AB48511F6FE}" dt="2020-05-09T12:25:50.243" v="407" actId="1076"/>
+      <pc:sldChg chg="addSp delSp modSp mod">
+        <pc:chgData name="rodrigo antoniaci" userId="7098e09bc143075b" providerId="LiveId" clId="{9FCE2944-FAD2-4A75-8632-2AB48511F6FE}" dt="2020-05-21T17:28:14.136" v="1057" actId="478"/>
         <pc:sldMkLst>
           <pc:docMk/>
           <pc:sldMk cId="2910102106" sldId="256"/>
@@ -176,6 +177,14 @@
             <ac:spMk id="11" creationId="{D84A1F35-8F16-4E5C-B0B5-6DFF014BC9DC}"/>
           </ac:spMkLst>
         </pc:spChg>
+        <pc:graphicFrameChg chg="add del modGraphic">
+          <ac:chgData name="rodrigo antoniaci" userId="7098e09bc143075b" providerId="LiveId" clId="{9FCE2944-FAD2-4A75-8632-2AB48511F6FE}" dt="2020-05-21T17:28:14.136" v="1057" actId="478"/>
+          <ac:graphicFrameMkLst>
+            <pc:docMk/>
+            <pc:sldMk cId="2910102106" sldId="256"/>
+            <ac:graphicFrameMk id="8" creationId="{5BEEB107-F3B4-475E-95D4-6C91AEA333A5}"/>
+          </ac:graphicFrameMkLst>
+        </pc:graphicFrameChg>
       </pc:sldChg>
       <pc:sldChg chg="addSp delSp modSp mod">
         <pc:chgData name="rodrigo antoniaci" userId="7098e09bc143075b" providerId="LiveId" clId="{9FCE2944-FAD2-4A75-8632-2AB48511F6FE}" dt="2020-05-09T12:58:58.888" v="699" actId="14100"/>
@@ -730,6 +739,69 @@
           </ac:picMkLst>
         </pc:picChg>
       </pc:sldChg>
+      <pc:sldChg chg="addSp delSp modSp new mod ord">
+        <pc:chgData name="rodrigo antoniaci" userId="7098e09bc143075b" providerId="LiveId" clId="{9FCE2944-FAD2-4A75-8632-2AB48511F6FE}" dt="2020-05-21T18:27:59.575" v="1070" actId="688"/>
+        <pc:sldMkLst>
+          <pc:docMk/>
+          <pc:sldMk cId="3655687634" sldId="264"/>
+        </pc:sldMkLst>
+        <pc:spChg chg="del">
+          <ac:chgData name="rodrigo antoniaci" userId="7098e09bc143075b" providerId="LiveId" clId="{9FCE2944-FAD2-4A75-8632-2AB48511F6FE}" dt="2020-05-21T17:28:32.483" v="1061" actId="478"/>
+          <ac:spMkLst>
+            <pc:docMk/>
+            <pc:sldMk cId="3655687634" sldId="264"/>
+            <ac:spMk id="2" creationId="{D556AF26-EEA4-4EE1-8C8F-86D3C89B990D}"/>
+          </ac:spMkLst>
+        </pc:spChg>
+        <pc:spChg chg="del">
+          <ac:chgData name="rodrigo antoniaci" userId="7098e09bc143075b" providerId="LiveId" clId="{9FCE2944-FAD2-4A75-8632-2AB48511F6FE}" dt="2020-05-21T17:28:34.772" v="1062" actId="478"/>
+          <ac:spMkLst>
+            <pc:docMk/>
+            <pc:sldMk cId="3655687634" sldId="264"/>
+            <ac:spMk id="3" creationId="{B5E1FE10-8ACA-4DD5-811F-BDB032F7FC03}"/>
+          </ac:spMkLst>
+        </pc:spChg>
+        <pc:spChg chg="add mod">
+          <ac:chgData name="rodrigo antoniaci" userId="7098e09bc143075b" providerId="LiveId" clId="{9FCE2944-FAD2-4A75-8632-2AB48511F6FE}" dt="2020-05-21T17:28:37.061" v="1063" actId="1076"/>
+          <ac:spMkLst>
+            <pc:docMk/>
+            <pc:sldMk cId="3655687634" sldId="264"/>
+            <ac:spMk id="4" creationId="{7591C793-B4C3-4BCD-B56D-56DDA9356FEF}"/>
+          </ac:spMkLst>
+        </pc:spChg>
+        <pc:spChg chg="add mod">
+          <ac:chgData name="rodrigo antoniaci" userId="7098e09bc143075b" providerId="LiveId" clId="{9FCE2944-FAD2-4A75-8632-2AB48511F6FE}" dt="2020-05-21T17:28:37.061" v="1063" actId="1076"/>
+          <ac:spMkLst>
+            <pc:docMk/>
+            <pc:sldMk cId="3655687634" sldId="264"/>
+            <ac:spMk id="5" creationId="{2F9C24BC-8415-4B14-B79C-0EE44BE7E767}"/>
+          </ac:spMkLst>
+        </pc:spChg>
+        <pc:grpChg chg="add del mod">
+          <ac:chgData name="rodrigo antoniaci" userId="7098e09bc143075b" providerId="LiveId" clId="{9FCE2944-FAD2-4A75-8632-2AB48511F6FE}" dt="2020-05-21T18:27:52.623" v="1066" actId="478"/>
+          <ac:grpSpMkLst>
+            <pc:docMk/>
+            <pc:sldMk cId="3655687634" sldId="264"/>
+            <ac:grpSpMk id="7" creationId="{26386D5B-DDC0-497E-81C7-E95F5D54D179}"/>
+          </ac:grpSpMkLst>
+        </pc:grpChg>
+        <pc:picChg chg="add mod">
+          <ac:chgData name="rodrigo antoniaci" userId="7098e09bc143075b" providerId="LiveId" clId="{9FCE2944-FAD2-4A75-8632-2AB48511F6FE}" dt="2020-05-21T17:28:37.061" v="1063" actId="1076"/>
+          <ac:picMkLst>
+            <pc:docMk/>
+            <pc:sldMk cId="3655687634" sldId="264"/>
+            <ac:picMk id="6" creationId="{21BEE91B-9C7B-4AD3-80D1-EF9A046A06C9}"/>
+          </ac:picMkLst>
+        </pc:picChg>
+        <pc:picChg chg="add mod">
+          <ac:chgData name="rodrigo antoniaci" userId="7098e09bc143075b" providerId="LiveId" clId="{9FCE2944-FAD2-4A75-8632-2AB48511F6FE}" dt="2020-05-21T18:27:59.575" v="1070" actId="688"/>
+          <ac:picMkLst>
+            <pc:docMk/>
+            <pc:sldMk cId="3655687634" sldId="264"/>
+            <ac:picMk id="9" creationId="{6F5A7230-5541-44F2-A080-512709A29D4D}"/>
+          </ac:picMkLst>
+        </pc:picChg>
+      </pc:sldChg>
     </pc:docChg>
   </pc:docChgLst>
 </pc:chgInfo>
@@ -817,7 +889,7 @@
           <a:p>
             <a:fld id="{28E1F0B2-4E2F-401F-9715-870D0866C75B}" type="datetimeFigureOut">
               <a:rPr lang="pt-BR" smtClean="0"/>
-              <a:t>09/05/2020</a:t>
+              <a:t>21/05/2020</a:t>
             </a:fld>
             <a:endParaRPr lang="pt-BR"/>
           </a:p>
@@ -1298,7 +1370,7 @@
             <a:fld id="{B61BEF0D-F0BB-DE4B-95CE-6DB70DBA9567}" type="datetimeFigureOut">
               <a:rPr lang="en-US" dirty="0"/>
               <a:pPr/>
-              <a:t>5/9/2020</a:t>
+              <a:t>5/21/2020</a:t>
             </a:fld>
             <a:endParaRPr lang="en-US" dirty="0"/>
           </a:p>
@@ -1586,7 +1658,7 @@
             <a:fld id="{B61BEF0D-F0BB-DE4B-95CE-6DB70DBA9567}" type="datetimeFigureOut">
               <a:rPr lang="en-US" dirty="0"/>
               <a:pPr/>
-              <a:t>5/9/2020</a:t>
+              <a:t>5/21/2020</a:t>
             </a:fld>
             <a:endParaRPr lang="en-US" dirty="0"/>
           </a:p>
@@ -1842,7 +1914,7 @@
             <a:fld id="{B61BEF0D-F0BB-DE4B-95CE-6DB70DBA9567}" type="datetimeFigureOut">
               <a:rPr lang="en-US" dirty="0"/>
               <a:pPr/>
-              <a:t>5/9/2020</a:t>
+              <a:t>5/21/2020</a:t>
             </a:fld>
             <a:endParaRPr lang="en-US" dirty="0"/>
           </a:p>
@@ -2308,7 +2380,7 @@
             <a:fld id="{B61BEF0D-F0BB-DE4B-95CE-6DB70DBA9567}" type="datetimeFigureOut">
               <a:rPr lang="en-US" dirty="0"/>
               <a:pPr/>
-              <a:t>5/9/2020</a:t>
+              <a:t>5/21/2020</a:t>
             </a:fld>
             <a:endParaRPr lang="en-US" dirty="0"/>
           </a:p>
@@ -2485,7 +2557,7 @@
             <a:fld id="{B61BEF0D-F0BB-DE4B-95CE-6DB70DBA9567}" type="datetimeFigureOut">
               <a:rPr lang="en-US" dirty="0"/>
               <a:pPr/>
-              <a:t>5/9/2020</a:t>
+              <a:t>5/21/2020</a:t>
             </a:fld>
             <a:endParaRPr lang="en-US" dirty="0"/>
           </a:p>
@@ -3058,7 +3130,7 @@
             <a:fld id="{B61BEF0D-F0BB-DE4B-95CE-6DB70DBA9567}" type="datetimeFigureOut">
               <a:rPr lang="en-US" dirty="0"/>
               <a:pPr/>
-              <a:t>5/9/2020</a:t>
+              <a:t>5/21/2020</a:t>
             </a:fld>
             <a:endParaRPr lang="en-US" dirty="0"/>
           </a:p>
@@ -3387,7 +3459,7 @@
             <a:fld id="{B61BEF0D-F0BB-DE4B-95CE-6DB70DBA9567}" type="datetimeFigureOut">
               <a:rPr lang="en-US" dirty="0"/>
               <a:pPr/>
-              <a:t>5/9/2020</a:t>
+              <a:t>5/21/2020</a:t>
             </a:fld>
             <a:endParaRPr lang="en-US" dirty="0"/>
           </a:p>
@@ -3559,7 +3631,7 @@
             <a:fld id="{B61BEF0D-F0BB-DE4B-95CE-6DB70DBA9567}" type="datetimeFigureOut">
               <a:rPr lang="en-US" dirty="0"/>
               <a:pPr/>
-              <a:t>5/9/2020</a:t>
+              <a:t>5/21/2020</a:t>
             </a:fld>
             <a:endParaRPr lang="en-US" dirty="0"/>
           </a:p>
@@ -3736,7 +3808,7 @@
             <a:fld id="{B61BEF0D-F0BB-DE4B-95CE-6DB70DBA9567}" type="datetimeFigureOut">
               <a:rPr lang="en-US" dirty="0"/>
               <a:pPr/>
-              <a:t>5/9/2020</a:t>
+              <a:t>5/21/2020</a:t>
             </a:fld>
             <a:endParaRPr lang="en-US" dirty="0"/>
           </a:p>
@@ -3903,7 +3975,7 @@
             <a:fld id="{B61BEF0D-F0BB-DE4B-95CE-6DB70DBA9567}" type="datetimeFigureOut">
               <a:rPr lang="en-US" dirty="0"/>
               <a:pPr/>
-              <a:t>5/9/2020</a:t>
+              <a:t>5/21/2020</a:t>
             </a:fld>
             <a:endParaRPr lang="en-US" dirty="0"/>
           </a:p>
@@ -4157,7 +4229,7 @@
             <a:fld id="{B61BEF0D-F0BB-DE4B-95CE-6DB70DBA9567}" type="datetimeFigureOut">
               <a:rPr lang="en-US" dirty="0"/>
               <a:pPr/>
-              <a:t>5/9/2020</a:t>
+              <a:t>5/21/2020</a:t>
             </a:fld>
             <a:endParaRPr lang="en-US" dirty="0"/>
           </a:p>
@@ -4446,7 +4518,7 @@
             <a:fld id="{B61BEF0D-F0BB-DE4B-95CE-6DB70DBA9567}" type="datetimeFigureOut">
               <a:rPr lang="en-US" dirty="0"/>
               <a:pPr/>
-              <a:t>5/9/2020</a:t>
+              <a:t>5/21/2020</a:t>
             </a:fld>
             <a:endParaRPr lang="en-US" dirty="0"/>
           </a:p>
@@ -4873,7 +4945,7 @@
             <a:fld id="{B61BEF0D-F0BB-DE4B-95CE-6DB70DBA9567}" type="datetimeFigureOut">
               <a:rPr lang="en-US" dirty="0"/>
               <a:pPr/>
-              <a:t>5/9/2020</a:t>
+              <a:t>5/21/2020</a:t>
             </a:fld>
             <a:endParaRPr lang="en-US" dirty="0"/>
           </a:p>
@@ -4988,7 +5060,7 @@
             <a:fld id="{B61BEF0D-F0BB-DE4B-95CE-6DB70DBA9567}" type="datetimeFigureOut">
               <a:rPr lang="en-US" dirty="0"/>
               <a:pPr/>
-              <a:t>5/9/2020</a:t>
+              <a:t>5/21/2020</a:t>
             </a:fld>
             <a:endParaRPr lang="en-US" dirty="0"/>
           </a:p>
@@ -5080,7 +5152,7 @@
             <a:fld id="{B61BEF0D-F0BB-DE4B-95CE-6DB70DBA9567}" type="datetimeFigureOut">
               <a:rPr lang="en-US" dirty="0"/>
               <a:pPr/>
-              <a:t>5/9/2020</a:t>
+              <a:t>5/21/2020</a:t>
             </a:fld>
             <a:endParaRPr lang="en-US" dirty="0"/>
           </a:p>
@@ -5360,7 +5432,7 @@
             <a:fld id="{B61BEF0D-F0BB-DE4B-95CE-6DB70DBA9567}" type="datetimeFigureOut">
               <a:rPr lang="en-US" dirty="0"/>
               <a:pPr/>
-              <a:t>5/9/2020</a:t>
+              <a:t>5/21/2020</a:t>
             </a:fld>
             <a:endParaRPr lang="en-US" dirty="0"/>
           </a:p>
@@ -5648,7 +5720,7 @@
             <a:fld id="{B61BEF0D-F0BB-DE4B-95CE-6DB70DBA9567}" type="datetimeFigureOut">
               <a:rPr lang="en-US" dirty="0"/>
               <a:pPr/>
-              <a:t>5/9/2020</a:t>
+              <a:t>5/21/2020</a:t>
             </a:fld>
             <a:endParaRPr lang="en-US" dirty="0"/>
           </a:p>
@@ -5876,7 +5948,7 @@
             <a:fld id="{B61BEF0D-F0BB-DE4B-95CE-6DB70DBA9567}" type="datetimeFigureOut">
               <a:rPr lang="en-US" dirty="0"/>
               <a:pPr/>
-              <a:t>5/9/2020</a:t>
+              <a:t>5/21/2020</a:t>
             </a:fld>
             <a:endParaRPr lang="en-US" dirty="0"/>
           </a:p>
@@ -6641,6 +6713,66 @@
           <a:chExt cx="0" cy="0"/>
         </a:xfrm>
       </p:grpSpPr>
+      <p:pic>
+        <p:nvPicPr>
+          <p:cNvPr id="9" name="Imagem 8" descr="Fundo preto com letras brancas&#10;&#10;Descrição gerada automaticamente">
+            <a:extLst>
+              <a:ext uri="{FF2B5EF4-FFF2-40B4-BE49-F238E27FC236}">
+                <a16:creationId xmlns:a16="http://schemas.microsoft.com/office/drawing/2014/main" id="{6F5A7230-5541-44F2-A080-512709A29D4D}"/>
+              </a:ext>
+            </a:extLst>
+          </p:cNvPr>
+          <p:cNvPicPr>
+            <a:picLocks noChangeAspect="1"/>
+          </p:cNvPicPr>
+          <p:nvPr/>
+        </p:nvPicPr>
+        <p:blipFill>
+          <a:blip r:embed="rId2"/>
+          <a:stretch>
+            <a:fillRect/>
+          </a:stretch>
+        </p:blipFill>
+        <p:spPr>
+          <a:xfrm rot="1608408">
+            <a:off x="1647204" y="456785"/>
+            <a:ext cx="8897592" cy="5944430"/>
+          </a:xfrm>
+          <a:prstGeom prst="rect">
+            <a:avLst/>
+          </a:prstGeom>
+        </p:spPr>
+      </p:pic>
+    </p:spTree>
+    <p:extLst>
+      <p:ext uri="{BB962C8B-B14F-4D97-AF65-F5344CB8AC3E}">
+        <p14:creationId xmlns:p14="http://schemas.microsoft.com/office/powerpoint/2010/main" val="3655687634"/>
+      </p:ext>
+    </p:extLst>
+  </p:cSld>
+  <p:clrMapOvr>
+    <a:masterClrMapping/>
+  </p:clrMapOvr>
+</p:sld>
+</file>
+
+<file path=ppt/slides/slide2.xml><?xml version="1.0" encoding="utf-8"?>
+<p:sld xmlns:a="http://schemas.openxmlformats.org/drawingml/2006/main" xmlns:r="http://schemas.openxmlformats.org/officeDocument/2006/relationships" xmlns:p="http://schemas.openxmlformats.org/presentationml/2006/main">
+  <p:cSld>
+    <p:spTree>
+      <p:nvGrpSpPr>
+        <p:cNvPr id="1" name=""/>
+        <p:cNvGrpSpPr/>
+        <p:nvPr/>
+      </p:nvGrpSpPr>
+      <p:grpSpPr>
+        <a:xfrm>
+          <a:off x="0" y="0"/>
+          <a:ext cx="0" cy="0"/>
+          <a:chOff x="0" y="0"/>
+          <a:chExt cx="0" cy="0"/>
+        </a:xfrm>
+      </p:grpSpPr>
       <p:sp>
         <p:nvSpPr>
           <p:cNvPr id="2" name="Título 1">
@@ -7140,7 +7272,7 @@
 </p:sld>
 </file>
 
-<file path=ppt/slides/slide2.xml><?xml version="1.0" encoding="utf-8"?>
+<file path=ppt/slides/slide3.xml><?xml version="1.0" encoding="utf-8"?>
 <p:sld xmlns:a="http://schemas.openxmlformats.org/drawingml/2006/main" xmlns:r="http://schemas.openxmlformats.org/officeDocument/2006/relationships" xmlns:p="http://schemas.openxmlformats.org/presentationml/2006/main">
   <p:cSld>
     <p:spTree>
@@ -7871,7 +8003,7 @@
 </p:sld>
 </file>
 
-<file path=ppt/slides/slide3.xml><?xml version="1.0" encoding="utf-8"?>
+<file path=ppt/slides/slide4.xml><?xml version="1.0" encoding="utf-8"?>
 <p:sld xmlns:a="http://schemas.openxmlformats.org/drawingml/2006/main" xmlns:r="http://schemas.openxmlformats.org/officeDocument/2006/relationships" xmlns:p="http://schemas.openxmlformats.org/presentationml/2006/main">
   <p:cSld>
     <p:spTree>
@@ -8281,7 +8413,7 @@
 </p:sld>
 </file>
 
-<file path=ppt/slides/slide4.xml><?xml version="1.0" encoding="utf-8"?>
+<file path=ppt/slides/slide5.xml><?xml version="1.0" encoding="utf-8"?>
 <p:sld xmlns:a="http://schemas.openxmlformats.org/drawingml/2006/main" xmlns:r="http://schemas.openxmlformats.org/officeDocument/2006/relationships" xmlns:p="http://schemas.openxmlformats.org/presentationml/2006/main">
   <p:cSld>
     <p:spTree>
@@ -8646,7 +8778,7 @@
 </p:sld>
 </file>
 
-<file path=ppt/slides/slide5.xml><?xml version="1.0" encoding="utf-8"?>
+<file path=ppt/slides/slide6.xml><?xml version="1.0" encoding="utf-8"?>
 <p:sld xmlns:a="http://schemas.openxmlformats.org/drawingml/2006/main" xmlns:r="http://schemas.openxmlformats.org/officeDocument/2006/relationships" xmlns:p="http://schemas.openxmlformats.org/presentationml/2006/main">
   <p:cSld>
     <p:spTree>
@@ -9054,7 +9186,7 @@
 </p:sld>
 </file>
 
-<file path=ppt/slides/slide6.xml><?xml version="1.0" encoding="utf-8"?>
+<file path=ppt/slides/slide7.xml><?xml version="1.0" encoding="utf-8"?>
 <p:sld xmlns:a="http://schemas.openxmlformats.org/drawingml/2006/main" xmlns:r="http://schemas.openxmlformats.org/officeDocument/2006/relationships" xmlns:p="http://schemas.openxmlformats.org/presentationml/2006/main">
   <p:cSld>
     <p:spTree>
@@ -9368,7 +9500,7 @@
 </p:sld>
 </file>
 
-<file path=ppt/slides/slide7.xml><?xml version="1.0" encoding="utf-8"?>
+<file path=ppt/slides/slide8.xml><?xml version="1.0" encoding="utf-8"?>
 <p:sld xmlns:a="http://schemas.openxmlformats.org/drawingml/2006/main" xmlns:r="http://schemas.openxmlformats.org/officeDocument/2006/relationships" xmlns:p="http://schemas.openxmlformats.org/presentationml/2006/main">
   <p:cSld>
     <p:spTree>

</xml_diff>